<commit_message>
add cv and coverletter to sun company
</commit_message>
<xml_diff>
--- a/main CV.pptx
+++ b/main CV.pptx
@@ -5052,15 +5052,7 @@
                   <a:srgbClr val="222224"/>
                 </a:solidFill>
               </a:rPr>
-              <a:t>HTML, CSS, JavaScript, </a:t>
-            </a:r>
-            <a:r>
-              <a:rPr lang="en-US" sz="1600" b="1" dirty="0" smtClean="0">
-                <a:solidFill>
-                  <a:srgbClr val="222224"/>
-                </a:solidFill>
-              </a:rPr>
-              <a:t>GitHub</a:t>
+              <a:t>HTML, CSS, JavaScript, GitHub</a:t>
             </a:r>
             <a:endParaRPr lang="en-US" sz="1600" b="1" dirty="0">
               <a:solidFill>

</xml_diff>